<commit_message>
updated readme, code and visualizations
</commit_message>
<xml_diff>
--- a/CaseStudy1_Final_Presentation.pptx
+++ b/CaseStudy1_Final_Presentation.pptx
@@ -3740,10 +3740,15 @@
             <p:ph idx="1"/>
           </p:nvPr>
         </p:nvSpPr>
-        <p:spPr/>
+        <p:spPr>
+          <a:xfrm>
+            <a:off x="50202" y="2015733"/>
+            <a:ext cx="8079696" cy="3450613"/>
+          </a:xfrm>
+        </p:spPr>
         <p:txBody>
           <a:bodyPr>
-            <a:normAutofit fontScale="85000" lnSpcReduction="10000"/>
+            <a:normAutofit fontScale="70000" lnSpcReduction="20000"/>
           </a:bodyPr>
           <a:lstStyle/>
           <a:p>

</xml_diff>

<commit_message>
updated slides and toptenbreweries viz
</commit_message>
<xml_diff>
--- a/CaseStudy1_Final_Presentation.pptx
+++ b/CaseStudy1_Final_Presentation.pptx
@@ -115,6 +115,11 @@
       </a:defRPr>
     </a:lvl9pPr>
   </p:defaultTextStyle>
+  <p:extLst>
+    <p:ext uri="{EFAFB233-063F-42B5-8137-9DF3F51BA10A}">
+      <p15:sldGuideLst xmlns:p15="http://schemas.microsoft.com/office/powerpoint/2012/main"/>
+    </p:ext>
+  </p:extLst>
 </p:presentation>
 </file>
 
@@ -257,7 +262,7 @@
           <a:p>
             <a:fld id="{48A87A34-81AB-432B-8DAE-1953F412C126}" type="datetimeFigureOut">
               <a:rPr lang="en-US" dirty="0"/>
-              <a:t>3/4/21</a:t>
+              <a:t>3/5/21</a:t>
             </a:fld>
             <a:endParaRPr lang="en-US" dirty="0"/>
           </a:p>
@@ -463,7 +468,7 @@
           <a:p>
             <a:fld id="{48A87A34-81AB-432B-8DAE-1953F412C126}" type="datetimeFigureOut">
               <a:rPr lang="en-US" dirty="0"/>
-              <a:t>3/4/21</a:t>
+              <a:t>3/5/21</a:t>
             </a:fld>
             <a:endParaRPr lang="en-US" dirty="0"/>
           </a:p>
@@ -673,7 +678,7 @@
           <a:p>
             <a:fld id="{48A87A34-81AB-432B-8DAE-1953F412C126}" type="datetimeFigureOut">
               <a:rPr lang="en-US" dirty="0"/>
-              <a:t>3/4/21</a:t>
+              <a:t>3/5/21</a:t>
             </a:fld>
             <a:endParaRPr lang="en-US" dirty="0"/>
           </a:p>
@@ -869,7 +874,7 @@
           <a:p>
             <a:fld id="{48A87A34-81AB-432B-8DAE-1953F412C126}" type="datetimeFigureOut">
               <a:rPr lang="en-US" dirty="0"/>
-              <a:t>3/4/21</a:t>
+              <a:t>3/5/21</a:t>
             </a:fld>
             <a:endParaRPr lang="en-US" dirty="0"/>
           </a:p>
@@ -1143,7 +1148,7 @@
           <a:p>
             <a:fld id="{48A87A34-81AB-432B-8DAE-1953F412C126}" type="datetimeFigureOut">
               <a:rPr lang="en-US" dirty="0"/>
-              <a:t>3/4/21</a:t>
+              <a:t>3/5/21</a:t>
             </a:fld>
             <a:endParaRPr lang="en-US" dirty="0"/>
           </a:p>
@@ -1406,7 +1411,7 @@
           <a:p>
             <a:fld id="{48A87A34-81AB-432B-8DAE-1953F412C126}" type="datetimeFigureOut">
               <a:rPr lang="en-US" dirty="0"/>
-              <a:t>3/4/21</a:t>
+              <a:t>3/5/21</a:t>
             </a:fld>
             <a:endParaRPr lang="en-US" dirty="0"/>
           </a:p>
@@ -1817,7 +1822,7 @@
           <a:p>
             <a:fld id="{48A87A34-81AB-432B-8DAE-1953F412C126}" type="datetimeFigureOut">
               <a:rPr lang="en-US" dirty="0"/>
-              <a:t>3/4/21</a:t>
+              <a:t>3/5/21</a:t>
             </a:fld>
             <a:endParaRPr lang="en-US" dirty="0"/>
           </a:p>
@@ -1961,7 +1966,7 @@
           <a:p>
             <a:fld id="{48A87A34-81AB-432B-8DAE-1953F412C126}" type="datetimeFigureOut">
               <a:rPr lang="en-US" dirty="0"/>
-              <a:t>3/4/21</a:t>
+              <a:t>3/5/21</a:t>
             </a:fld>
             <a:endParaRPr lang="en-US" dirty="0"/>
           </a:p>
@@ -2082,7 +2087,7 @@
           <a:p>
             <a:fld id="{48A87A34-81AB-432B-8DAE-1953F412C126}" type="datetimeFigureOut">
               <a:rPr lang="en-US" dirty="0"/>
-              <a:t>3/4/21</a:t>
+              <a:t>3/5/21</a:t>
             </a:fld>
             <a:endParaRPr lang="en-US" dirty="0"/>
           </a:p>
@@ -2328,7 +2333,7 @@
           <a:p>
             <a:fld id="{48A87A34-81AB-432B-8DAE-1953F412C126}" type="datetimeFigureOut">
               <a:rPr lang="en-US" dirty="0"/>
-              <a:t>3/4/21</a:t>
+              <a:t>3/5/21</a:t>
             </a:fld>
             <a:endParaRPr lang="en-US" dirty="0"/>
           </a:p>
@@ -2769,7 +2774,7 @@
             <a:fld id="{48A87A34-81AB-432B-8DAE-1953F412C126}" type="datetimeFigureOut">
               <a:rPr lang="en-US" dirty="0"/>
               <a:pPr/>
-              <a:t>3/4/21</a:t>
+              <a:t>3/5/21</a:t>
             </a:fld>
             <a:endParaRPr lang="en-US" dirty="0"/>
           </a:p>
@@ -3092,7 +3097,7 @@
             <a:fld id="{48A87A34-81AB-432B-8DAE-1953F412C126}" type="datetimeFigureOut">
               <a:rPr lang="en-US" dirty="0"/>
               <a:pPr/>
-              <a:t>3/4/21</a:t>
+              <a:t>3/5/21</a:t>
             </a:fld>
             <a:endParaRPr lang="en-US" dirty="0"/>
           </a:p>
@@ -4138,7 +4143,16 @@
             </a:r>
           </a:p>
           <a:p>
-            <a:endParaRPr lang="en-US" dirty="0"/>
+            <a:r>
+              <a:rPr lang="en-US" dirty="0"/>
+              <a:t>California is second with 39.</a:t>
+            </a:r>
+          </a:p>
+          <a:p>
+            <a:r>
+              <a:rPr lang="en-US" dirty="0"/>
+              <a:t>Michigan is third with 32.</a:t>
+            </a:r>
           </a:p>
         </p:txBody>
       </p:sp>
@@ -4466,39 +4480,6 @@
           </a:p>
         </p:txBody>
       </p:sp>
-      <p:sp>
-        <p:nvSpPr>
-          <p:cNvPr id="3" name="Content Placeholder 2">
-            <a:extLst>
-              <a:ext uri="{FF2B5EF4-FFF2-40B4-BE49-F238E27FC236}">
-                <a16:creationId xmlns:a16="http://schemas.microsoft.com/office/drawing/2014/main" id="{76CF9089-107C-1C41-B8A2-5FCF2282F3B7}"/>
-              </a:ext>
-            </a:extLst>
-          </p:cNvPr>
-          <p:cNvSpPr>
-            <a:spLocks noGrp="1"/>
-          </p:cNvSpPr>
-          <p:nvPr>
-            <p:ph sz="half" idx="1"/>
-          </p:nvPr>
-        </p:nvSpPr>
-        <p:spPr>
-          <a:xfrm>
-            <a:off x="438338" y="2020135"/>
-            <a:ext cx="4645152" cy="3448595"/>
-          </a:xfrm>
-        </p:spPr>
-        <p:txBody>
-          <a:bodyPr/>
-          <a:lstStyle/>
-          <a:p>
-            <a:r>
-              <a:rPr lang="en-US" dirty="0"/>
-              <a:t>M</a:t>
-            </a:r>
-          </a:p>
-        </p:txBody>
-      </p:sp>
       <p:pic>
         <p:nvPicPr>
           <p:cNvPr id="5" name="Picture 4">
@@ -4529,6 +4510,51 @@
           </a:prstGeom>
         </p:spPr>
       </p:pic>
+      <p:sp>
+        <p:nvSpPr>
+          <p:cNvPr id="6" name="Content Placeholder 2">
+            <a:extLst>
+              <a:ext uri="{FF2B5EF4-FFF2-40B4-BE49-F238E27FC236}">
+                <a16:creationId xmlns:a16="http://schemas.microsoft.com/office/drawing/2014/main" id="{3D931FEA-56A6-DC46-AC75-42DFEE27336F}"/>
+              </a:ext>
+            </a:extLst>
+          </p:cNvPr>
+          <p:cNvSpPr>
+            <a:spLocks noGrp="1"/>
+          </p:cNvSpPr>
+          <p:nvPr>
+            <p:ph sz="half" idx="1"/>
+          </p:nvPr>
+        </p:nvSpPr>
+        <p:spPr>
+          <a:xfrm>
+            <a:off x="438150" y="2020888"/>
+            <a:ext cx="4645025" cy="3448050"/>
+          </a:xfrm>
+        </p:spPr>
+        <p:txBody>
+          <a:bodyPr/>
+          <a:lstStyle/>
+          <a:p>
+            <a:r>
+              <a:rPr lang="en-US" dirty="0"/>
+              <a:t>We focused on the top ten states with the highest median international beer units.</a:t>
+            </a:r>
+          </a:p>
+          <a:p>
+            <a:r>
+              <a:rPr lang="en-US" dirty="0"/>
+              <a:t>The state with the highest median IBU is Florida with 55, followed by Delaware with 52 and District of Columbia with 47.5</a:t>
+            </a:r>
+          </a:p>
+          <a:p>
+            <a:endParaRPr lang="en-US" dirty="0"/>
+          </a:p>
+          <a:p>
+            <a:endParaRPr lang="en-US" dirty="0"/>
+          </a:p>
+        </p:txBody>
+      </p:sp>
     </p:spTree>
     <p:extLst>
       <p:ext uri="{BB962C8B-B14F-4D97-AF65-F5344CB8AC3E}">
@@ -4615,8 +4641,31 @@
           <a:p>
             <a:r>
               <a:rPr lang="en-US" dirty="0"/>
-              <a:t>M</a:t>
-            </a:r>
+              <a:t>Kentucky has the maximum alcohol beer with an ABV of </a:t>
+            </a:r>
+            <a:r>
+              <a:rPr lang="en-US" b="1" dirty="0"/>
+              <a:t>12.5%</a:t>
+            </a:r>
+            <a:r>
+              <a:rPr lang="en-US" dirty="0"/>
+              <a:t>.</a:t>
+            </a:r>
+          </a:p>
+          <a:p>
+            <a:r>
+              <a:rPr lang="en-US" dirty="0"/>
+              <a:t>Indiana is second with 12%.</a:t>
+            </a:r>
+          </a:p>
+          <a:p>
+            <a:r>
+              <a:rPr lang="en-US" dirty="0"/>
+              <a:t>New York is third with 10%</a:t>
+            </a:r>
+          </a:p>
+          <a:p>
+            <a:endParaRPr lang="en-US" dirty="0"/>
           </a:p>
         </p:txBody>
       </p:sp>
@@ -4736,8 +4785,28 @@
           <a:p>
             <a:r>
               <a:rPr lang="en-US" dirty="0"/>
-              <a:t>M</a:t>
-            </a:r>
+              <a:t>Oregon has the most bitter beer with an IBU of </a:t>
+            </a:r>
+            <a:r>
+              <a:rPr lang="en-US" b="1" dirty="0"/>
+              <a:t>138.</a:t>
+            </a:r>
+            <a:endParaRPr lang="en-US" dirty="0"/>
+          </a:p>
+          <a:p>
+            <a:r>
+              <a:rPr lang="en-US" dirty="0"/>
+              <a:t>Virginia has the second most bitter beer with an IBU of 135.</a:t>
+            </a:r>
+          </a:p>
+          <a:p>
+            <a:r>
+              <a:rPr lang="en-US" dirty="0"/>
+              <a:t>Massachusetts has the third most bitter beer with an IBU of 130.</a:t>
+            </a:r>
+          </a:p>
+          <a:p>
+            <a:endParaRPr lang="en-US" dirty="0"/>
           </a:p>
         </p:txBody>
       </p:sp>

</xml_diff>

<commit_message>
readme and presentation update
</commit_message>
<xml_diff>
--- a/CaseStudy1_Final_Presentation.pptx
+++ b/CaseStudy1_Final_Presentation.pptx
@@ -4441,7 +4441,7 @@
             </a:pPr>
             <a:r>
               <a:rPr lang="en-US" dirty="0"/>
-              <a:t>We want to investigate how a KNN classifier can be used to predict Region of the Beer.</a:t>
+              <a:t>We want to investigate how a KNN classifier can be used to predict the Region of the Beer.</a:t>
             </a:r>
           </a:p>
           <a:p>
@@ -6022,7 +6022,7 @@
         <p:spPr>
           <a:xfrm>
             <a:off x="675122" y="2090915"/>
-            <a:ext cx="4645152" cy="3441520"/>
+            <a:ext cx="4645152" cy="3962196"/>
           </a:xfrm>
         </p:spPr>
         <p:txBody>
@@ -6046,6 +6046,19 @@
             <a:r>
               <a:rPr lang="en-US" dirty="0"/>
               <a:t>Additionally, we plotted the linear regression line to prove even further of the positive relationship (slope of line is positive).</a:t>
+            </a:r>
+          </a:p>
+          <a:p>
+            <a:r>
+              <a:rPr lang="en-US" dirty="0"/>
+              <a:t>Key Takeaway:</a:t>
+            </a:r>
+          </a:p>
+          <a:p>
+            <a:pPr lvl="1"/>
+            <a:r>
+              <a:rPr lang="en-US" dirty="0"/>
+              <a:t>Those who want bitter beer would also want high alcohol content in their beer.</a:t>
             </a:r>
           </a:p>
         </p:txBody>

</xml_diff>